<commit_message>
new solutions in x class
</commit_message>
<xml_diff>
--- a/XI class/02. DS and Algo - Module 2/06. Рекурсия/Recursion.pptx
+++ b/XI class/02. DS and Algo - Module 2/06. Рекурсия/Recursion.pptx
@@ -303,7 +303,7 @@
           <a:p>
             <a:fld id="{4E087215-0C8F-4762-A664-737A353EC9A4}" type="datetimeFigureOut">
               <a:rPr lang="bg-BG" smtClean="0"/>
-              <a:t>10.07.24 г.</a:t>
+              <a:t>25.4.2025 г.</a:t>
             </a:fld>
             <a:endParaRPr lang="bg-BG"/>
           </a:p>
@@ -499,7 +499,7 @@
           <a:p>
             <a:fld id="{72D84649-876A-46C9-8472-14CB09C070D8}" type="datetimeFigureOut">
               <a:rPr lang="en-US" smtClean="0"/>
-              <a:t>7/10/24</a:t>
+              <a:t>4/25/2025</a:t>
             </a:fld>
             <a:endParaRPr lang="en-US"/>
           </a:p>
@@ -6824,7 +6824,7 @@
           <a:p>
             <a:r>
               <a:rPr lang="en-US" sz="3550" dirty="0"/>
-              <a:t>Използване на рекурсия, рекурсивно и интеративно обхождане</a:t>
+              <a:t>Използване на рекурсия, рекурсивно и итеративно обхождане</a:t>
             </a:r>
             <a:endParaRPr lang="en-US" sz="3550" dirty="0">
               <a:cs typeface="Calibri"/>

</xml_diff>